<commit_message>
add Foreign language translation
</commit_message>
<xml_diff>
--- a/0963180222-田园园-在线考试系统-答辩ppt.pptx
+++ b/0963180222-田园园-在线考试系统-答辩ppt.pptx
@@ -264,7 +264,7 @@
             <a:fld id="{673B58EF-4ABD-40F4-ACA4-FE81D742E6DD}" type="datetimeFigureOut">
               <a:rPr lang="zh-CN" altLang="en-US" smtClean="0"/>
               <a:pPr/>
-              <a:t>2021/12/25/Saturday</a:t>
+              <a:t>2021/12/27</a:t>
             </a:fld>
             <a:endParaRPr lang="zh-CN" altLang="en-US" dirty="0"/>
           </a:p>
@@ -2431,7 +2431,7 @@
                 <a:latin typeface="微软雅黑" pitchFamily="34" charset="-122"/>
                 <a:ea typeface="微软雅黑" pitchFamily="34" charset="-122"/>
               </a:rPr>
-              <a:t>网路工程专业</a:t>
+              <a:t>网络工程专业</a:t>
             </a:r>
             <a:r>
               <a:rPr lang="en-US" altLang="zh-CN" dirty="0">

</xml_diff>